<commit_message>
Updated Reading Guide Prompts
</commit_message>
<xml_diff>
--- a/modules/MgmntSizeLimits/READING_Boxrucker_2002.pptx
+++ b/modules/MgmntSizeLimits/READING_Boxrucker_2002.pptx
@@ -221,7 +221,7 @@
           <a:p>
             <a:fld id="{EF599A65-391F-4EB8-9242-B59EE92B5FB9}" type="datetimeFigureOut">
               <a:rPr lang="en-US" smtClean="0"/>
-              <a:t>3/13/2016</a:t>
+              <a:t>3/26/2018</a:t>
             </a:fld>
             <a:endParaRPr lang="en-US"/>
           </a:p>
@@ -1293,7 +1293,7 @@
           <a:p>
             <a:fld id="{07A46C8F-DB9C-4B91-A1F1-A860256637FA}" type="datetimeFigureOut">
               <a:rPr lang="en-US" smtClean="0"/>
-              <a:t>3/13/2016</a:t>
+              <a:t>3/26/2018</a:t>
             </a:fld>
             <a:endParaRPr lang="en-US"/>
           </a:p>
@@ -1463,7 +1463,7 @@
           <a:p>
             <a:fld id="{07A46C8F-DB9C-4B91-A1F1-A860256637FA}" type="datetimeFigureOut">
               <a:rPr lang="en-US" smtClean="0"/>
-              <a:t>3/13/2016</a:t>
+              <a:t>3/26/2018</a:t>
             </a:fld>
             <a:endParaRPr lang="en-US"/>
           </a:p>
@@ -1643,7 +1643,7 @@
           <a:p>
             <a:fld id="{07A46C8F-DB9C-4B91-A1F1-A860256637FA}" type="datetimeFigureOut">
               <a:rPr lang="en-US" smtClean="0"/>
-              <a:t>3/13/2016</a:t>
+              <a:t>3/26/2018</a:t>
             </a:fld>
             <a:endParaRPr lang="en-US"/>
           </a:p>
@@ -1813,7 +1813,7 @@
           <a:p>
             <a:fld id="{07A46C8F-DB9C-4B91-A1F1-A860256637FA}" type="datetimeFigureOut">
               <a:rPr lang="en-US" smtClean="0"/>
-              <a:t>3/13/2016</a:t>
+              <a:t>3/26/2018</a:t>
             </a:fld>
             <a:endParaRPr lang="en-US"/>
           </a:p>
@@ -2057,7 +2057,7 @@
           <a:p>
             <a:fld id="{07A46C8F-DB9C-4B91-A1F1-A860256637FA}" type="datetimeFigureOut">
               <a:rPr lang="en-US" smtClean="0"/>
-              <a:t>3/13/2016</a:t>
+              <a:t>3/26/2018</a:t>
             </a:fld>
             <a:endParaRPr lang="en-US"/>
           </a:p>
@@ -2289,7 +2289,7 @@
           <a:p>
             <a:fld id="{07A46C8F-DB9C-4B91-A1F1-A860256637FA}" type="datetimeFigureOut">
               <a:rPr lang="en-US" smtClean="0"/>
-              <a:t>3/13/2016</a:t>
+              <a:t>3/26/2018</a:t>
             </a:fld>
             <a:endParaRPr lang="en-US"/>
           </a:p>
@@ -2656,7 +2656,7 @@
           <a:p>
             <a:fld id="{07A46C8F-DB9C-4B91-A1F1-A860256637FA}" type="datetimeFigureOut">
               <a:rPr lang="en-US" smtClean="0"/>
-              <a:t>3/13/2016</a:t>
+              <a:t>3/26/2018</a:t>
             </a:fld>
             <a:endParaRPr lang="en-US"/>
           </a:p>
@@ -2774,7 +2774,7 @@
           <a:p>
             <a:fld id="{07A46C8F-DB9C-4B91-A1F1-A860256637FA}" type="datetimeFigureOut">
               <a:rPr lang="en-US" smtClean="0"/>
-              <a:t>3/13/2016</a:t>
+              <a:t>3/26/2018</a:t>
             </a:fld>
             <a:endParaRPr lang="en-US"/>
           </a:p>
@@ -2869,7 +2869,7 @@
           <a:p>
             <a:fld id="{07A46C8F-DB9C-4B91-A1F1-A860256637FA}" type="datetimeFigureOut">
               <a:rPr lang="en-US" smtClean="0"/>
-              <a:t>3/13/2016</a:t>
+              <a:t>3/26/2018</a:t>
             </a:fld>
             <a:endParaRPr lang="en-US"/>
           </a:p>
@@ -3146,7 +3146,7 @@
           <a:p>
             <a:fld id="{07A46C8F-DB9C-4B91-A1F1-A860256637FA}" type="datetimeFigureOut">
               <a:rPr lang="en-US" smtClean="0"/>
-              <a:t>3/13/2016</a:t>
+              <a:t>3/26/2018</a:t>
             </a:fld>
             <a:endParaRPr lang="en-US"/>
           </a:p>
@@ -3403,7 +3403,7 @@
           <a:p>
             <a:fld id="{07A46C8F-DB9C-4B91-A1F1-A860256637FA}" type="datetimeFigureOut">
               <a:rPr lang="en-US" smtClean="0"/>
-              <a:t>3/13/2016</a:t>
+              <a:t>3/26/2018</a:t>
             </a:fld>
             <a:endParaRPr lang="en-US"/>
           </a:p>
@@ -3616,7 +3616,7 @@
           <a:p>
             <a:fld id="{07A46C8F-DB9C-4B91-A1F1-A860256637FA}" type="datetimeFigureOut">
               <a:rPr lang="en-US" smtClean="0"/>
-              <a:t>3/13/2016</a:t>
+              <a:t>3/26/2018</a:t>
             </a:fld>
             <a:endParaRPr lang="en-US"/>
           </a:p>
@@ -5023,7 +5023,7 @@
         </p:blipFill>
         <p:spPr>
           <a:xfrm>
-            <a:off x="3956494" y="2243899"/>
+            <a:off x="3968686" y="3552011"/>
             <a:ext cx="4486275" cy="962025"/>
           </a:xfrm>
           <a:prstGeom prst="rect">
@@ -5047,7 +5047,7 @@
         </p:blipFill>
         <p:spPr>
           <a:xfrm>
-            <a:off x="3961257" y="3546729"/>
+            <a:off x="3913632" y="2207032"/>
             <a:ext cx="4476750" cy="971550"/>
           </a:xfrm>
           <a:prstGeom prst="rect">
@@ -5087,7 +5087,7 @@
         </p:nvSpPr>
         <p:spPr>
           <a:xfrm>
-            <a:off x="1636776" y="2514600"/>
+            <a:off x="1648968" y="3822712"/>
             <a:ext cx="1711687" cy="369332"/>
           </a:xfrm>
           <a:prstGeom prst="rect">
@@ -5117,7 +5117,7 @@
         </p:nvSpPr>
         <p:spPr>
           <a:xfrm>
-            <a:off x="1642872" y="3810000"/>
+            <a:off x="1595247" y="2470303"/>
             <a:ext cx="1711687" cy="369332"/>
           </a:xfrm>
           <a:prstGeom prst="rect">
@@ -5166,6 +5166,236 @@
               <a:t>page 1347, col 1</a:t>
             </a:r>
             <a:endParaRPr lang="en-US" dirty="0"/>
+          </a:p>
+        </p:txBody>
+      </p:sp>
+      <p:sp>
+        <p:nvSpPr>
+          <p:cNvPr id="10" name="Rectangle 9"/>
+          <p:cNvSpPr/>
+          <p:nvPr/>
+        </p:nvSpPr>
+        <p:spPr>
+          <a:xfrm>
+            <a:off x="3968686" y="2207032"/>
+            <a:ext cx="593586" cy="263271"/>
+          </a:xfrm>
+          <a:prstGeom prst="rect">
+            <a:avLst/>
+          </a:prstGeom>
+          <a:solidFill>
+            <a:schemeClr val="bg1"/>
+          </a:solidFill>
+          <a:ln>
+            <a:noFill/>
+          </a:ln>
+        </p:spPr>
+        <p:style>
+          <a:lnRef idx="2">
+            <a:schemeClr val="accent1">
+              <a:shade val="50000"/>
+            </a:schemeClr>
+          </a:lnRef>
+          <a:fillRef idx="1">
+            <a:schemeClr val="accent1"/>
+          </a:fillRef>
+          <a:effectRef idx="0">
+            <a:schemeClr val="accent1"/>
+          </a:effectRef>
+          <a:fontRef idx="minor">
+            <a:schemeClr val="lt1"/>
+          </a:fontRef>
+        </p:style>
+        <p:txBody>
+          <a:bodyPr rtlCol="0" anchor="ctr"/>
+          <a:lstStyle/>
+          <a:p>
+            <a:pPr algn="ctr"/>
+            <a:endParaRPr lang="en-US"/>
+          </a:p>
+        </p:txBody>
+      </p:sp>
+      <p:sp>
+        <p:nvSpPr>
+          <p:cNvPr id="11" name="Rectangle 10"/>
+          <p:cNvSpPr/>
+          <p:nvPr/>
+        </p:nvSpPr>
+        <p:spPr>
+          <a:xfrm>
+            <a:off x="5385680" y="2955377"/>
+            <a:ext cx="3004701" cy="223206"/>
+          </a:xfrm>
+          <a:prstGeom prst="rect">
+            <a:avLst/>
+          </a:prstGeom>
+          <a:solidFill>
+            <a:schemeClr val="bg1"/>
+          </a:solidFill>
+          <a:ln>
+            <a:noFill/>
+          </a:ln>
+        </p:spPr>
+        <p:style>
+          <a:lnRef idx="2">
+            <a:schemeClr val="accent1">
+              <a:shade val="50000"/>
+            </a:schemeClr>
+          </a:lnRef>
+          <a:fillRef idx="1">
+            <a:schemeClr val="accent1"/>
+          </a:fillRef>
+          <a:effectRef idx="0">
+            <a:schemeClr val="accent1"/>
+          </a:effectRef>
+          <a:fontRef idx="minor">
+            <a:schemeClr val="lt1"/>
+          </a:fontRef>
+        </p:style>
+        <p:txBody>
+          <a:bodyPr rtlCol="0" anchor="ctr"/>
+          <a:lstStyle/>
+          <a:p>
+            <a:pPr algn="ctr"/>
+            <a:endParaRPr lang="en-US"/>
+          </a:p>
+        </p:txBody>
+      </p:sp>
+      <p:sp>
+        <p:nvSpPr>
+          <p:cNvPr id="12" name="Rectangle 11"/>
+          <p:cNvSpPr/>
+          <p:nvPr/>
+        </p:nvSpPr>
+        <p:spPr>
+          <a:xfrm>
+            <a:off x="7000473" y="4250765"/>
+            <a:ext cx="1454487" cy="263271"/>
+          </a:xfrm>
+          <a:prstGeom prst="rect">
+            <a:avLst/>
+          </a:prstGeom>
+          <a:solidFill>
+            <a:schemeClr val="bg1"/>
+          </a:solidFill>
+          <a:ln>
+            <a:noFill/>
+          </a:ln>
+        </p:spPr>
+        <p:style>
+          <a:lnRef idx="2">
+            <a:schemeClr val="accent1">
+              <a:shade val="50000"/>
+            </a:schemeClr>
+          </a:lnRef>
+          <a:fillRef idx="1">
+            <a:schemeClr val="accent1"/>
+          </a:fillRef>
+          <a:effectRef idx="0">
+            <a:schemeClr val="accent1"/>
+          </a:effectRef>
+          <a:fontRef idx="minor">
+            <a:schemeClr val="lt1"/>
+          </a:fontRef>
+        </p:style>
+        <p:txBody>
+          <a:bodyPr rtlCol="0" anchor="ctr"/>
+          <a:lstStyle/>
+          <a:p>
+            <a:pPr algn="ctr"/>
+            <a:endParaRPr lang="en-US"/>
+          </a:p>
+        </p:txBody>
+      </p:sp>
+      <p:sp>
+        <p:nvSpPr>
+          <p:cNvPr id="13" name="Rectangle 12"/>
+          <p:cNvSpPr/>
+          <p:nvPr/>
+        </p:nvSpPr>
+        <p:spPr>
+          <a:xfrm>
+            <a:off x="4069205" y="4907266"/>
+            <a:ext cx="3732378" cy="305524"/>
+          </a:xfrm>
+          <a:prstGeom prst="rect">
+            <a:avLst/>
+          </a:prstGeom>
+          <a:solidFill>
+            <a:schemeClr val="bg1"/>
+          </a:solidFill>
+          <a:ln>
+            <a:noFill/>
+          </a:ln>
+        </p:spPr>
+        <p:style>
+          <a:lnRef idx="2">
+            <a:schemeClr val="accent1">
+              <a:shade val="50000"/>
+            </a:schemeClr>
+          </a:lnRef>
+          <a:fillRef idx="1">
+            <a:schemeClr val="accent1"/>
+          </a:fillRef>
+          <a:effectRef idx="0">
+            <a:schemeClr val="accent1"/>
+          </a:effectRef>
+          <a:fontRef idx="minor">
+            <a:schemeClr val="lt1"/>
+          </a:fontRef>
+        </p:style>
+        <p:txBody>
+          <a:bodyPr rtlCol="0" anchor="ctr"/>
+          <a:lstStyle/>
+          <a:p>
+            <a:pPr algn="ctr"/>
+            <a:endParaRPr lang="en-US"/>
+          </a:p>
+        </p:txBody>
+      </p:sp>
+      <p:sp>
+        <p:nvSpPr>
+          <p:cNvPr id="14" name="Rectangle 13"/>
+          <p:cNvSpPr/>
+          <p:nvPr/>
+        </p:nvSpPr>
+        <p:spPr>
+          <a:xfrm>
+            <a:off x="7827041" y="6388200"/>
+            <a:ext cx="593586" cy="263271"/>
+          </a:xfrm>
+          <a:prstGeom prst="rect">
+            <a:avLst/>
+          </a:prstGeom>
+          <a:solidFill>
+            <a:schemeClr val="bg1"/>
+          </a:solidFill>
+          <a:ln>
+            <a:noFill/>
+          </a:ln>
+        </p:spPr>
+        <p:style>
+          <a:lnRef idx="2">
+            <a:schemeClr val="accent1">
+              <a:shade val="50000"/>
+            </a:schemeClr>
+          </a:lnRef>
+          <a:fillRef idx="1">
+            <a:schemeClr val="accent1"/>
+          </a:fillRef>
+          <a:effectRef idx="0">
+            <a:schemeClr val="accent1"/>
+          </a:effectRef>
+          <a:fontRef idx="minor">
+            <a:schemeClr val="lt1"/>
+          </a:fontRef>
+        </p:style>
+        <p:txBody>
+          <a:bodyPr rtlCol="0" anchor="ctr"/>
+          <a:lstStyle/>
+          <a:p>
+            <a:pPr algn="ctr"/>
+            <a:endParaRPr lang="en-US"/>
           </a:p>
         </p:txBody>
       </p:sp>
@@ -5253,7 +5483,7 @@
                                           </p:stCondLst>
                                         </p:cTn>
                                         <p:tgtEl>
-                                          <p:spTgt spid="7"/>
+                                          <p:spTgt spid="8"/>
                                         </p:tgtEl>
                                         <p:attrNameLst>
                                           <p:attrName>style.visibility</p:attrName>
@@ -5289,7 +5519,61 @@
                                           </p:stCondLst>
                                         </p:cTn>
                                         <p:tgtEl>
-                                          <p:spTgt spid="4"/>
+                                          <p:spTgt spid="5"/>
+                                        </p:tgtEl>
+                                        <p:attrNameLst>
+                                          <p:attrName>style.visibility</p:attrName>
+                                        </p:attrNameLst>
+                                      </p:cBhvr>
+                                      <p:to>
+                                        <p:strVal val="visible"/>
+                                      </p:to>
+                                    </p:set>
+                                  </p:childTnLst>
+                                </p:cTn>
+                              </p:par>
+                              <p:par>
+                                <p:cTn id="13" presetID="1" presetClass="entr" presetSubtype="0" fill="hold" grpId="0" nodeType="withEffect">
+                                  <p:stCondLst>
+                                    <p:cond delay="0"/>
+                                  </p:stCondLst>
+                                  <p:childTnLst>
+                                    <p:set>
+                                      <p:cBhvr>
+                                        <p:cTn id="14" dur="1" fill="hold">
+                                          <p:stCondLst>
+                                            <p:cond delay="0"/>
+                                          </p:stCondLst>
+                                        </p:cTn>
+                                        <p:tgtEl>
+                                          <p:spTgt spid="10"/>
+                                        </p:tgtEl>
+                                        <p:attrNameLst>
+                                          <p:attrName>style.visibility</p:attrName>
+                                        </p:attrNameLst>
+                                      </p:cBhvr>
+                                      <p:to>
+                                        <p:strVal val="visible"/>
+                                      </p:to>
+                                    </p:set>
+                                  </p:childTnLst>
+                                </p:cTn>
+                              </p:par>
+                              <p:par>
+                                <p:cTn id="15" presetID="1" presetClass="entr" presetSubtype="0" fill="hold" grpId="0" nodeType="withEffect">
+                                  <p:stCondLst>
+                                    <p:cond delay="0"/>
+                                  </p:stCondLst>
+                                  <p:childTnLst>
+                                    <p:set>
+                                      <p:cBhvr>
+                                        <p:cTn id="16" dur="1" fill="hold">
+                                          <p:stCondLst>
+                                            <p:cond delay="0"/>
+                                          </p:stCondLst>
+                                        </p:cTn>
+                                        <p:tgtEl>
+                                          <p:spTgt spid="11"/>
                                         </p:tgtEl>
                                         <p:attrNameLst>
                                           <p:attrName>style.visibility</p:attrName>
@@ -5309,26 +5593,26 @@
                     </p:cTn>
                   </p:par>
                   <p:par>
-                    <p:cTn id="13" fill="hold">
+                    <p:cTn id="17" fill="hold">
                       <p:stCondLst>
                         <p:cond delay="indefinite"/>
                       </p:stCondLst>
                       <p:childTnLst>
                         <p:par>
-                          <p:cTn id="14" fill="hold">
+                          <p:cTn id="18" fill="hold">
                             <p:stCondLst>
                               <p:cond delay="0"/>
                             </p:stCondLst>
                             <p:childTnLst>
                               <p:par>
-                                <p:cTn id="15" presetID="1" presetClass="entr" presetSubtype="0" fill="hold" grpId="0" nodeType="clickEffect">
+                                <p:cTn id="19" presetID="1" presetClass="entr" presetSubtype="0" fill="hold" grpId="0" nodeType="clickEffect">
                                   <p:stCondLst>
                                     <p:cond delay="0"/>
                                   </p:stCondLst>
                                   <p:childTnLst>
                                     <p:set>
                                       <p:cBhvr>
-                                        <p:cTn id="16" dur="1" fill="hold">
+                                        <p:cTn id="20" dur="1" fill="hold">
                                           <p:stCondLst>
                                             <p:cond delay="0"/>
                                           </p:stCondLst>
@@ -5355,26 +5639,26 @@
                           </p:cTn>
                         </p:par>
                         <p:par>
-                          <p:cTn id="17" fill="hold">
+                          <p:cTn id="21" fill="hold">
                             <p:stCondLst>
                               <p:cond delay="0"/>
                             </p:stCondLst>
                             <p:childTnLst>
                               <p:par>
-                                <p:cTn id="18" presetID="1" presetClass="entr" presetSubtype="0" fill="hold" grpId="0" nodeType="afterEffect">
+                                <p:cTn id="22" presetID="1" presetClass="entr" presetSubtype="0" fill="hold" grpId="0" nodeType="afterEffect">
                                   <p:stCondLst>
                                     <p:cond delay="0"/>
                                   </p:stCondLst>
                                   <p:childTnLst>
                                     <p:set>
                                       <p:cBhvr>
-                                        <p:cTn id="19" dur="1" fill="hold">
+                                        <p:cTn id="23" dur="1" fill="hold">
                                           <p:stCondLst>
                                             <p:cond delay="0"/>
                                           </p:stCondLst>
                                         </p:cTn>
                                         <p:tgtEl>
-                                          <p:spTgt spid="8"/>
+                                          <p:spTgt spid="7"/>
                                         </p:tgtEl>
                                         <p:attrNameLst>
                                           <p:attrName>style.visibility</p:attrName>
@@ -5391,26 +5675,53 @@
                           </p:cTn>
                         </p:par>
                         <p:par>
-                          <p:cTn id="20" fill="hold">
+                          <p:cTn id="24" fill="hold">
                             <p:stCondLst>
                               <p:cond delay="0"/>
                             </p:stCondLst>
                             <p:childTnLst>
                               <p:par>
-                                <p:cTn id="21" presetID="1" presetClass="entr" presetSubtype="0" fill="hold" nodeType="afterEffect">
+                                <p:cTn id="25" presetID="1" presetClass="entr" presetSubtype="0" fill="hold" nodeType="afterEffect">
                                   <p:stCondLst>
                                     <p:cond delay="0"/>
                                   </p:stCondLst>
                                   <p:childTnLst>
                                     <p:set>
                                       <p:cBhvr>
-                                        <p:cTn id="22" dur="1" fill="hold">
+                                        <p:cTn id="26" dur="1" fill="hold">
                                           <p:stCondLst>
                                             <p:cond delay="0"/>
                                           </p:stCondLst>
                                         </p:cTn>
                                         <p:tgtEl>
-                                          <p:spTgt spid="5"/>
+                                          <p:spTgt spid="4"/>
+                                        </p:tgtEl>
+                                        <p:attrNameLst>
+                                          <p:attrName>style.visibility</p:attrName>
+                                        </p:attrNameLst>
+                                      </p:cBhvr>
+                                      <p:to>
+                                        <p:strVal val="visible"/>
+                                      </p:to>
+                                    </p:set>
+                                  </p:childTnLst>
+                                </p:cTn>
+                              </p:par>
+                              <p:par>
+                                <p:cTn id="27" presetID="1" presetClass="entr" presetSubtype="0" fill="hold" grpId="0" nodeType="withEffect">
+                                  <p:stCondLst>
+                                    <p:cond delay="0"/>
+                                  </p:stCondLst>
+                                  <p:childTnLst>
+                                    <p:set>
+                                      <p:cBhvr>
+                                        <p:cTn id="28" dur="1" fill="hold">
+                                          <p:stCondLst>
+                                            <p:cond delay="0"/>
+                                          </p:stCondLst>
+                                        </p:cTn>
+                                        <p:tgtEl>
+                                          <p:spTgt spid="12"/>
                                         </p:tgtEl>
                                         <p:attrNameLst>
                                           <p:attrName>style.visibility</p:attrName>
@@ -5430,26 +5741,26 @@
                     </p:cTn>
                   </p:par>
                   <p:par>
-                    <p:cTn id="23" fill="hold">
+                    <p:cTn id="29" fill="hold">
                       <p:stCondLst>
                         <p:cond delay="indefinite"/>
                       </p:stCondLst>
                       <p:childTnLst>
                         <p:par>
-                          <p:cTn id="24" fill="hold">
+                          <p:cTn id="30" fill="hold">
                             <p:stCondLst>
                               <p:cond delay="0"/>
                             </p:stCondLst>
                             <p:childTnLst>
                               <p:par>
-                                <p:cTn id="25" presetID="1" presetClass="entr" presetSubtype="0" fill="hold" grpId="0" nodeType="clickEffect">
+                                <p:cTn id="31" presetID="1" presetClass="entr" presetSubtype="0" fill="hold" grpId="0" nodeType="clickEffect">
                                   <p:stCondLst>
                                     <p:cond delay="0"/>
                                   </p:stCondLst>
                                   <p:childTnLst>
                                     <p:set>
                                       <p:cBhvr>
-                                        <p:cTn id="26" dur="1" fill="hold">
+                                        <p:cTn id="32" dur="1" fill="hold">
                                           <p:stCondLst>
                                             <p:cond delay="0"/>
                                           </p:stCondLst>
@@ -5476,20 +5787,20 @@
                           </p:cTn>
                         </p:par>
                         <p:par>
-                          <p:cTn id="27" fill="hold">
+                          <p:cTn id="33" fill="hold">
                             <p:stCondLst>
                               <p:cond delay="0"/>
                             </p:stCondLst>
                             <p:childTnLst>
                               <p:par>
-                                <p:cTn id="28" presetID="1" presetClass="entr" presetSubtype="0" fill="hold" grpId="0" nodeType="afterEffect">
+                                <p:cTn id="34" presetID="1" presetClass="entr" presetSubtype="0" fill="hold" grpId="0" nodeType="afterEffect">
                                   <p:stCondLst>
                                     <p:cond delay="0"/>
                                   </p:stCondLst>
                                   <p:childTnLst>
                                     <p:set>
                                       <p:cBhvr>
-                                        <p:cTn id="29" dur="1" fill="hold">
+                                        <p:cTn id="35" dur="1" fill="hold">
                                           <p:stCondLst>
                                             <p:cond delay="0"/>
                                           </p:stCondLst>
@@ -5509,20 +5820,74 @@
                                 </p:cTn>
                               </p:par>
                               <p:par>
-                                <p:cTn id="30" presetID="1" presetClass="entr" presetSubtype="0" fill="hold" nodeType="withEffect">
+                                <p:cTn id="36" presetID="1" presetClass="entr" presetSubtype="0" fill="hold" nodeType="withEffect">
                                   <p:stCondLst>
                                     <p:cond delay="0"/>
                                   </p:stCondLst>
                                   <p:childTnLst>
                                     <p:set>
                                       <p:cBhvr>
-                                        <p:cTn id="31" dur="1" fill="hold">
+                                        <p:cTn id="37" dur="1" fill="hold">
                                           <p:stCondLst>
                                             <p:cond delay="0"/>
                                           </p:stCondLst>
                                         </p:cTn>
                                         <p:tgtEl>
                                           <p:spTgt spid="6"/>
+                                        </p:tgtEl>
+                                        <p:attrNameLst>
+                                          <p:attrName>style.visibility</p:attrName>
+                                        </p:attrNameLst>
+                                      </p:cBhvr>
+                                      <p:to>
+                                        <p:strVal val="visible"/>
+                                      </p:to>
+                                    </p:set>
+                                  </p:childTnLst>
+                                </p:cTn>
+                              </p:par>
+                              <p:par>
+                                <p:cTn id="38" presetID="1" presetClass="entr" presetSubtype="0" fill="hold" grpId="0" nodeType="withEffect">
+                                  <p:stCondLst>
+                                    <p:cond delay="0"/>
+                                  </p:stCondLst>
+                                  <p:childTnLst>
+                                    <p:set>
+                                      <p:cBhvr>
+                                        <p:cTn id="39" dur="1" fill="hold">
+                                          <p:stCondLst>
+                                            <p:cond delay="0"/>
+                                          </p:stCondLst>
+                                        </p:cTn>
+                                        <p:tgtEl>
+                                          <p:spTgt spid="13"/>
+                                        </p:tgtEl>
+                                        <p:attrNameLst>
+                                          <p:attrName>style.visibility</p:attrName>
+                                        </p:attrNameLst>
+                                      </p:cBhvr>
+                                      <p:to>
+                                        <p:strVal val="visible"/>
+                                      </p:to>
+                                    </p:set>
+                                  </p:childTnLst>
+                                </p:cTn>
+                              </p:par>
+                              <p:par>
+                                <p:cTn id="40" presetID="1" presetClass="entr" presetSubtype="0" fill="hold" grpId="0" nodeType="withEffect">
+                                  <p:stCondLst>
+                                    <p:cond delay="0"/>
+                                  </p:stCondLst>
+                                  <p:childTnLst>
+                                    <p:set>
+                                      <p:cBhvr>
+                                        <p:cTn id="41" dur="1" fill="hold">
+                                          <p:stCondLst>
+                                            <p:cond delay="0"/>
+                                          </p:stCondLst>
+                                        </p:cTn>
+                                        <p:tgtEl>
+                                          <p:spTgt spid="14"/>
                                         </p:tgtEl>
                                         <p:attrNameLst>
                                           <p:attrName>style.visibility</p:attrName>
@@ -5567,6 +5932,11 @@
       <p:bldP spid="7" grpId="0"/>
       <p:bldP spid="8" grpId="0"/>
       <p:bldP spid="9" grpId="0"/>
+      <p:bldP spid="10" grpId="0" animBg="1"/>
+      <p:bldP spid="11" grpId="0" animBg="1"/>
+      <p:bldP spid="12" grpId="0" animBg="1"/>
+      <p:bldP spid="13" grpId="0" animBg="1"/>
+      <p:bldP spid="14" grpId="0" animBg="1"/>
     </p:bldLst>
   </p:timing>
 </p:sld>
@@ -5984,6 +6354,286 @@
           </a:prstGeom>
         </p:spPr>
       </p:pic>
+      <p:cxnSp>
+        <p:nvCxnSpPr>
+          <p:cNvPr id="7" name="Straight Connector 6"/>
+          <p:cNvCxnSpPr/>
+          <p:nvPr/>
+        </p:nvCxnSpPr>
+        <p:spPr>
+          <a:xfrm flipV="1">
+            <a:off x="2343150" y="2052536"/>
+            <a:ext cx="3921463" cy="13766"/>
+          </a:xfrm>
+          <a:prstGeom prst="line">
+            <a:avLst/>
+          </a:prstGeom>
+          <a:ln w="25400">
+            <a:solidFill>
+              <a:srgbClr val="FF0000"/>
+            </a:solidFill>
+          </a:ln>
+        </p:spPr>
+        <p:style>
+          <a:lnRef idx="1">
+            <a:schemeClr val="accent1"/>
+          </a:lnRef>
+          <a:fillRef idx="0">
+            <a:schemeClr val="accent1"/>
+          </a:fillRef>
+          <a:effectRef idx="0">
+            <a:schemeClr val="accent1"/>
+          </a:effectRef>
+          <a:fontRef idx="minor">
+            <a:schemeClr val="tx1"/>
+          </a:fontRef>
+        </p:style>
+      </p:cxnSp>
+      <p:cxnSp>
+        <p:nvCxnSpPr>
+          <p:cNvPr id="8" name="Straight Connector 7"/>
+          <p:cNvCxnSpPr/>
+          <p:nvPr/>
+        </p:nvCxnSpPr>
+        <p:spPr>
+          <a:xfrm flipV="1">
+            <a:off x="4601183" y="1828802"/>
+            <a:ext cx="2110902" cy="9727"/>
+          </a:xfrm>
+          <a:prstGeom prst="line">
+            <a:avLst/>
+          </a:prstGeom>
+          <a:ln w="25400">
+            <a:solidFill>
+              <a:srgbClr val="FF0000"/>
+            </a:solidFill>
+          </a:ln>
+        </p:spPr>
+        <p:style>
+          <a:lnRef idx="1">
+            <a:schemeClr val="accent1"/>
+          </a:lnRef>
+          <a:fillRef idx="0">
+            <a:schemeClr val="accent1"/>
+          </a:fillRef>
+          <a:effectRef idx="0">
+            <a:schemeClr val="accent1"/>
+          </a:effectRef>
+          <a:fontRef idx="minor">
+            <a:schemeClr val="tx1"/>
+          </a:fontRef>
+        </p:style>
+      </p:cxnSp>
+      <p:cxnSp>
+        <p:nvCxnSpPr>
+          <p:cNvPr id="12" name="Straight Connector 11"/>
+          <p:cNvCxnSpPr/>
+          <p:nvPr/>
+        </p:nvCxnSpPr>
+        <p:spPr>
+          <a:xfrm flipV="1">
+            <a:off x="5262461" y="3433864"/>
+            <a:ext cx="1538389" cy="13766"/>
+          </a:xfrm>
+          <a:prstGeom prst="line">
+            <a:avLst/>
+          </a:prstGeom>
+          <a:ln w="25400">
+            <a:solidFill>
+              <a:srgbClr val="FF0000"/>
+            </a:solidFill>
+          </a:ln>
+        </p:spPr>
+        <p:style>
+          <a:lnRef idx="1">
+            <a:schemeClr val="accent1"/>
+          </a:lnRef>
+          <a:fillRef idx="0">
+            <a:schemeClr val="accent1"/>
+          </a:fillRef>
+          <a:effectRef idx="0">
+            <a:schemeClr val="accent1"/>
+          </a:effectRef>
+          <a:fontRef idx="minor">
+            <a:schemeClr val="tx1"/>
+          </a:fontRef>
+        </p:style>
+      </p:cxnSp>
+      <p:cxnSp>
+        <p:nvCxnSpPr>
+          <p:cNvPr id="14" name="Straight Connector 13"/>
+          <p:cNvCxnSpPr/>
+          <p:nvPr/>
+        </p:nvCxnSpPr>
+        <p:spPr>
+          <a:xfrm>
+            <a:off x="2428470" y="3679164"/>
+            <a:ext cx="217453" cy="0"/>
+          </a:xfrm>
+          <a:prstGeom prst="line">
+            <a:avLst/>
+          </a:prstGeom>
+          <a:ln w="25400">
+            <a:solidFill>
+              <a:srgbClr val="FF0000"/>
+            </a:solidFill>
+          </a:ln>
+        </p:spPr>
+        <p:style>
+          <a:lnRef idx="1">
+            <a:schemeClr val="accent1"/>
+          </a:lnRef>
+          <a:fillRef idx="0">
+            <a:schemeClr val="accent1"/>
+          </a:fillRef>
+          <a:effectRef idx="0">
+            <a:schemeClr val="accent1"/>
+          </a:effectRef>
+          <a:fontRef idx="minor">
+            <a:schemeClr val="tx1"/>
+          </a:fontRef>
+        </p:style>
+      </p:cxnSp>
+      <p:cxnSp>
+        <p:nvCxnSpPr>
+          <p:cNvPr id="16" name="Straight Connector 15"/>
+          <p:cNvCxnSpPr/>
+          <p:nvPr/>
+        </p:nvCxnSpPr>
+        <p:spPr>
+          <a:xfrm>
+            <a:off x="5942890" y="5389919"/>
+            <a:ext cx="769194" cy="12364"/>
+          </a:xfrm>
+          <a:prstGeom prst="line">
+            <a:avLst/>
+          </a:prstGeom>
+          <a:ln w="25400">
+            <a:solidFill>
+              <a:srgbClr val="FF0000"/>
+            </a:solidFill>
+          </a:ln>
+        </p:spPr>
+        <p:style>
+          <a:lnRef idx="1">
+            <a:schemeClr val="accent1"/>
+          </a:lnRef>
+          <a:fillRef idx="0">
+            <a:schemeClr val="accent1"/>
+          </a:fillRef>
+          <a:effectRef idx="0">
+            <a:schemeClr val="accent1"/>
+          </a:effectRef>
+          <a:fontRef idx="minor">
+            <a:schemeClr val="tx1"/>
+          </a:fontRef>
+        </p:style>
+      </p:cxnSp>
+      <p:cxnSp>
+        <p:nvCxnSpPr>
+          <p:cNvPr id="17" name="Straight Connector 16"/>
+          <p:cNvCxnSpPr/>
+          <p:nvPr/>
+        </p:nvCxnSpPr>
+        <p:spPr>
+          <a:xfrm flipV="1">
+            <a:off x="2343150" y="5612860"/>
+            <a:ext cx="2919311" cy="17008"/>
+          </a:xfrm>
+          <a:prstGeom prst="line">
+            <a:avLst/>
+          </a:prstGeom>
+          <a:ln w="25400">
+            <a:solidFill>
+              <a:srgbClr val="FF0000"/>
+            </a:solidFill>
+          </a:ln>
+        </p:spPr>
+        <p:style>
+          <a:lnRef idx="1">
+            <a:schemeClr val="accent1"/>
+          </a:lnRef>
+          <a:fillRef idx="0">
+            <a:schemeClr val="accent1"/>
+          </a:fillRef>
+          <a:effectRef idx="0">
+            <a:schemeClr val="accent1"/>
+          </a:effectRef>
+          <a:fontRef idx="minor">
+            <a:schemeClr val="tx1"/>
+          </a:fontRef>
+        </p:style>
+      </p:cxnSp>
+      <p:cxnSp>
+        <p:nvCxnSpPr>
+          <p:cNvPr id="19" name="Straight Connector 18"/>
+          <p:cNvCxnSpPr/>
+          <p:nvPr/>
+        </p:nvCxnSpPr>
+        <p:spPr>
+          <a:xfrm flipV="1">
+            <a:off x="5715709" y="5629868"/>
+            <a:ext cx="996375" cy="9492"/>
+          </a:xfrm>
+          <a:prstGeom prst="line">
+            <a:avLst/>
+          </a:prstGeom>
+          <a:ln w="25400">
+            <a:solidFill>
+              <a:srgbClr val="FF0000"/>
+            </a:solidFill>
+          </a:ln>
+        </p:spPr>
+        <p:style>
+          <a:lnRef idx="1">
+            <a:schemeClr val="accent1"/>
+          </a:lnRef>
+          <a:fillRef idx="0">
+            <a:schemeClr val="accent1"/>
+          </a:fillRef>
+          <a:effectRef idx="0">
+            <a:schemeClr val="accent1"/>
+          </a:effectRef>
+          <a:fontRef idx="minor">
+            <a:schemeClr val="tx1"/>
+          </a:fontRef>
+        </p:style>
+      </p:cxnSp>
+      <p:cxnSp>
+        <p:nvCxnSpPr>
+          <p:cNvPr id="22" name="Straight Connector 21"/>
+          <p:cNvCxnSpPr/>
+          <p:nvPr/>
+        </p:nvCxnSpPr>
+        <p:spPr>
+          <a:xfrm flipV="1">
+            <a:off x="2399437" y="5866945"/>
+            <a:ext cx="1403368" cy="11158"/>
+          </a:xfrm>
+          <a:prstGeom prst="line">
+            <a:avLst/>
+          </a:prstGeom>
+          <a:ln w="25400">
+            <a:solidFill>
+              <a:srgbClr val="FF0000"/>
+            </a:solidFill>
+          </a:ln>
+        </p:spPr>
+        <p:style>
+          <a:lnRef idx="1">
+            <a:schemeClr val="accent1"/>
+          </a:lnRef>
+          <a:fillRef idx="0">
+            <a:schemeClr val="accent1"/>
+          </a:fillRef>
+          <a:effectRef idx="0">
+            <a:schemeClr val="accent1"/>
+          </a:effectRef>
+          <a:fontRef idx="minor">
+            <a:schemeClr val="tx1"/>
+          </a:fontRef>
+        </p:style>
+      </p:cxnSp>
     </p:spTree>
     <p:extLst>
       <p:ext uri="{BB962C8B-B14F-4D97-AF65-F5344CB8AC3E}">
@@ -6041,24 +6691,78 @@
                                   </p:childTnLst>
                                 </p:cTn>
                               </p:par>
-                            </p:childTnLst>
-                          </p:cTn>
-                        </p:par>
-                        <p:par>
-                          <p:cTn id="7" fill="hold">
-                            <p:stCondLst>
-                              <p:cond delay="0"/>
-                            </p:stCondLst>
-                            <p:childTnLst>
                               <p:par>
-                                <p:cTn id="8" presetID="1" presetClass="entr" presetSubtype="0" fill="hold" grpId="0" nodeType="afterEffect">
+                                <p:cTn id="7" presetID="1" presetClass="entr" presetSubtype="0" fill="hold" nodeType="withEffect">
                                   <p:stCondLst>
                                     <p:cond delay="0"/>
                                   </p:stCondLst>
                                   <p:childTnLst>
                                     <p:set>
                                       <p:cBhvr>
-                                        <p:cTn id="9" dur="1" fill="hold">
+                                        <p:cTn id="8" dur="1" fill="hold">
+                                          <p:stCondLst>
+                                            <p:cond delay="0"/>
+                                          </p:stCondLst>
+                                        </p:cTn>
+                                        <p:tgtEl>
+                                          <p:spTgt spid="7"/>
+                                        </p:tgtEl>
+                                        <p:attrNameLst>
+                                          <p:attrName>style.visibility</p:attrName>
+                                        </p:attrNameLst>
+                                      </p:cBhvr>
+                                      <p:to>
+                                        <p:strVal val="visible"/>
+                                      </p:to>
+                                    </p:set>
+                                  </p:childTnLst>
+                                </p:cTn>
+                              </p:par>
+                              <p:par>
+                                <p:cTn id="9" presetID="1" presetClass="entr" presetSubtype="0" fill="hold" nodeType="withEffect">
+                                  <p:stCondLst>
+                                    <p:cond delay="0"/>
+                                  </p:stCondLst>
+                                  <p:childTnLst>
+                                    <p:set>
+                                      <p:cBhvr>
+                                        <p:cTn id="10" dur="1" fill="hold">
+                                          <p:stCondLst>
+                                            <p:cond delay="0"/>
+                                          </p:stCondLst>
+                                        </p:cTn>
+                                        <p:tgtEl>
+                                          <p:spTgt spid="8"/>
+                                        </p:tgtEl>
+                                        <p:attrNameLst>
+                                          <p:attrName>style.visibility</p:attrName>
+                                        </p:attrNameLst>
+                                      </p:cBhvr>
+                                      <p:to>
+                                        <p:strVal val="visible"/>
+                                      </p:to>
+                                    </p:set>
+                                  </p:childTnLst>
+                                </p:cTn>
+                              </p:par>
+                            </p:childTnLst>
+                          </p:cTn>
+                        </p:par>
+                        <p:par>
+                          <p:cTn id="11" fill="hold">
+                            <p:stCondLst>
+                              <p:cond delay="0"/>
+                            </p:stCondLst>
+                            <p:childTnLst>
+                              <p:par>
+                                <p:cTn id="12" presetID="1" presetClass="entr" presetSubtype="0" fill="hold" grpId="0" nodeType="afterEffect">
+                                  <p:stCondLst>
+                                    <p:cond delay="0"/>
+                                  </p:stCondLst>
+                                  <p:childTnLst>
+                                    <p:set>
+                                      <p:cBhvr>
+                                        <p:cTn id="13" dur="1" fill="hold">
                                           <p:stCondLst>
                                             <p:cond delay="0"/>
                                           </p:stCondLst>
@@ -6088,26 +6792,26 @@
                     </p:cTn>
                   </p:par>
                   <p:par>
-                    <p:cTn id="10" fill="hold">
+                    <p:cTn id="14" fill="hold">
                       <p:stCondLst>
                         <p:cond delay="indefinite"/>
                       </p:stCondLst>
                       <p:childTnLst>
                         <p:par>
-                          <p:cTn id="11" fill="hold">
+                          <p:cTn id="15" fill="hold">
                             <p:stCondLst>
                               <p:cond delay="0"/>
                             </p:stCondLst>
                             <p:childTnLst>
                               <p:par>
-                                <p:cTn id="12" presetID="1" presetClass="entr" presetSubtype="0" fill="hold" nodeType="clickEffect">
+                                <p:cTn id="16" presetID="1" presetClass="entr" presetSubtype="0" fill="hold" nodeType="clickEffect">
                                   <p:stCondLst>
                                     <p:cond delay="0"/>
                                   </p:stCondLst>
                                   <p:childTnLst>
                                     <p:set>
                                       <p:cBhvr>
-                                        <p:cTn id="13" dur="1" fill="hold">
+                                        <p:cTn id="17" dur="1" fill="hold">
                                           <p:stCondLst>
                                             <p:cond delay="0"/>
                                           </p:stCondLst>
@@ -6126,24 +6830,78 @@
                                   </p:childTnLst>
                                 </p:cTn>
                               </p:par>
-                            </p:childTnLst>
-                          </p:cTn>
-                        </p:par>
-                        <p:par>
-                          <p:cTn id="14" fill="hold">
-                            <p:stCondLst>
-                              <p:cond delay="0"/>
-                            </p:stCondLst>
-                            <p:childTnLst>
                               <p:par>
-                                <p:cTn id="15" presetID="1" presetClass="entr" presetSubtype="0" fill="hold" grpId="0" nodeType="afterEffect">
+                                <p:cTn id="18" presetID="1" presetClass="entr" presetSubtype="0" fill="hold" nodeType="withEffect">
                                   <p:stCondLst>
                                     <p:cond delay="0"/>
                                   </p:stCondLst>
                                   <p:childTnLst>
                                     <p:set>
                                       <p:cBhvr>
-                                        <p:cTn id="16" dur="1" fill="hold">
+                                        <p:cTn id="19" dur="1" fill="hold">
+                                          <p:stCondLst>
+                                            <p:cond delay="0"/>
+                                          </p:stCondLst>
+                                        </p:cTn>
+                                        <p:tgtEl>
+                                          <p:spTgt spid="12"/>
+                                        </p:tgtEl>
+                                        <p:attrNameLst>
+                                          <p:attrName>style.visibility</p:attrName>
+                                        </p:attrNameLst>
+                                      </p:cBhvr>
+                                      <p:to>
+                                        <p:strVal val="visible"/>
+                                      </p:to>
+                                    </p:set>
+                                  </p:childTnLst>
+                                </p:cTn>
+                              </p:par>
+                              <p:par>
+                                <p:cTn id="20" presetID="1" presetClass="entr" presetSubtype="0" fill="hold" nodeType="withEffect">
+                                  <p:stCondLst>
+                                    <p:cond delay="0"/>
+                                  </p:stCondLst>
+                                  <p:childTnLst>
+                                    <p:set>
+                                      <p:cBhvr>
+                                        <p:cTn id="21" dur="1" fill="hold">
+                                          <p:stCondLst>
+                                            <p:cond delay="0"/>
+                                          </p:stCondLst>
+                                        </p:cTn>
+                                        <p:tgtEl>
+                                          <p:spTgt spid="14"/>
+                                        </p:tgtEl>
+                                        <p:attrNameLst>
+                                          <p:attrName>style.visibility</p:attrName>
+                                        </p:attrNameLst>
+                                      </p:cBhvr>
+                                      <p:to>
+                                        <p:strVal val="visible"/>
+                                      </p:to>
+                                    </p:set>
+                                  </p:childTnLst>
+                                </p:cTn>
+                              </p:par>
+                            </p:childTnLst>
+                          </p:cTn>
+                        </p:par>
+                        <p:par>
+                          <p:cTn id="22" fill="hold">
+                            <p:stCondLst>
+                              <p:cond delay="0"/>
+                            </p:stCondLst>
+                            <p:childTnLst>
+                              <p:par>
+                                <p:cTn id="23" presetID="1" presetClass="entr" presetSubtype="0" fill="hold" grpId="0" nodeType="afterEffect">
+                                  <p:stCondLst>
+                                    <p:cond delay="0"/>
+                                  </p:stCondLst>
+                                  <p:childTnLst>
+                                    <p:set>
+                                      <p:cBhvr>
+                                        <p:cTn id="24" dur="1" fill="hold">
                                           <p:stCondLst>
                                             <p:cond delay="0"/>
                                           </p:stCondLst>
@@ -6173,32 +6931,140 @@
                     </p:cTn>
                   </p:par>
                   <p:par>
-                    <p:cTn id="17" fill="hold">
+                    <p:cTn id="25" fill="hold">
                       <p:stCondLst>
                         <p:cond delay="indefinite"/>
                       </p:stCondLst>
                       <p:childTnLst>
                         <p:par>
-                          <p:cTn id="18" fill="hold">
+                          <p:cTn id="26" fill="hold">
                             <p:stCondLst>
                               <p:cond delay="0"/>
                             </p:stCondLst>
                             <p:childTnLst>
                               <p:par>
-                                <p:cTn id="19" presetID="1" presetClass="entr" presetSubtype="0" fill="hold" nodeType="clickEffect">
+                                <p:cTn id="27" presetID="1" presetClass="entr" presetSubtype="0" fill="hold" nodeType="clickEffect">
                                   <p:stCondLst>
                                     <p:cond delay="0"/>
                                   </p:stCondLst>
                                   <p:childTnLst>
                                     <p:set>
                                       <p:cBhvr>
-                                        <p:cTn id="20" dur="1" fill="hold">
+                                        <p:cTn id="28" dur="1" fill="hold">
                                           <p:stCondLst>
                                             <p:cond delay="0"/>
                                           </p:stCondLst>
                                         </p:cTn>
                                         <p:tgtEl>
                                           <p:spTgt spid="6"/>
+                                        </p:tgtEl>
+                                        <p:attrNameLst>
+                                          <p:attrName>style.visibility</p:attrName>
+                                        </p:attrNameLst>
+                                      </p:cBhvr>
+                                      <p:to>
+                                        <p:strVal val="visible"/>
+                                      </p:to>
+                                    </p:set>
+                                  </p:childTnLst>
+                                </p:cTn>
+                              </p:par>
+                              <p:par>
+                                <p:cTn id="29" presetID="1" presetClass="entr" presetSubtype="0" fill="hold" nodeType="withEffect">
+                                  <p:stCondLst>
+                                    <p:cond delay="0"/>
+                                  </p:stCondLst>
+                                  <p:childTnLst>
+                                    <p:set>
+                                      <p:cBhvr>
+                                        <p:cTn id="30" dur="1" fill="hold">
+                                          <p:stCondLst>
+                                            <p:cond delay="0"/>
+                                          </p:stCondLst>
+                                        </p:cTn>
+                                        <p:tgtEl>
+                                          <p:spTgt spid="16"/>
+                                        </p:tgtEl>
+                                        <p:attrNameLst>
+                                          <p:attrName>style.visibility</p:attrName>
+                                        </p:attrNameLst>
+                                      </p:cBhvr>
+                                      <p:to>
+                                        <p:strVal val="visible"/>
+                                      </p:to>
+                                    </p:set>
+                                  </p:childTnLst>
+                                </p:cTn>
+                              </p:par>
+                              <p:par>
+                                <p:cTn id="31" presetID="1" presetClass="entr" presetSubtype="0" fill="hold" nodeType="withEffect">
+                                  <p:stCondLst>
+                                    <p:cond delay="0"/>
+                                  </p:stCondLst>
+                                  <p:childTnLst>
+                                    <p:set>
+                                      <p:cBhvr>
+                                        <p:cTn id="32" dur="1" fill="hold">
+                                          <p:stCondLst>
+                                            <p:cond delay="0"/>
+                                          </p:stCondLst>
+                                        </p:cTn>
+                                        <p:tgtEl>
+                                          <p:spTgt spid="17"/>
+                                        </p:tgtEl>
+                                        <p:attrNameLst>
+                                          <p:attrName>style.visibility</p:attrName>
+                                        </p:attrNameLst>
+                                      </p:cBhvr>
+                                      <p:to>
+                                        <p:strVal val="visible"/>
+                                      </p:to>
+                                    </p:set>
+                                  </p:childTnLst>
+                                </p:cTn>
+                              </p:par>
+                              <p:par>
+                                <p:cTn id="33" presetID="1" presetClass="entr" presetSubtype="0" fill="hold" nodeType="withEffect">
+                                  <p:stCondLst>
+                                    <p:cond delay="0"/>
+                                  </p:stCondLst>
+                                  <p:childTnLst>
+                                    <p:set>
+                                      <p:cBhvr>
+                                        <p:cTn id="34" dur="1" fill="hold">
+                                          <p:stCondLst>
+                                            <p:cond delay="0"/>
+                                          </p:stCondLst>
+                                        </p:cTn>
+                                        <p:tgtEl>
+                                          <p:spTgt spid="19"/>
+                                        </p:tgtEl>
+                                        <p:attrNameLst>
+                                          <p:attrName>style.visibility</p:attrName>
+                                        </p:attrNameLst>
+                                      </p:cBhvr>
+                                      <p:to>
+                                        <p:strVal val="visible"/>
+                                      </p:to>
+                                    </p:set>
+                                  </p:childTnLst>
+                                </p:cTn>
+                              </p:par>
+                              <p:par>
+                                <p:cTn id="35" presetID="1" presetClass="entr" presetSubtype="0" fill="hold" nodeType="withEffect">
+                                  <p:stCondLst>
+                                    <p:cond delay="0"/>
+                                  </p:stCondLst>
+                                  <p:childTnLst>
+                                    <p:set>
+                                      <p:cBhvr>
+                                        <p:cTn id="36" dur="1" fill="hold">
+                                          <p:stCondLst>
+                                            <p:cond delay="0"/>
+                                          </p:stCondLst>
+                                        </p:cTn>
+                                        <p:tgtEl>
+                                          <p:spTgt spid="22"/>
                                         </p:tgtEl>
                                         <p:attrNameLst>
                                           <p:attrName>style.visibility</p:attrName>

</xml_diff>